<commit_message>
Fixed problems at slide Day_2_1.pptx
</commit_message>
<xml_diff>
--- a/Slides/Day_2_1.pptx
+++ b/Slides/Day_2_1.pptx
@@ -336,7 +336,7 @@
           <a:p>
             <a:fld id="{EDA8BDCB-78B0-4602-A2A4-46193FA57CAD}" type="datetimeFigureOut">
               <a:rPr lang="en-US" smtClean="0"/>
-              <a:t>7/15/2024</a:t>
+              <a:t>7/16/2024</a:t>
             </a:fld>
             <a:endParaRPr lang="en-US"/>
           </a:p>
@@ -610,7 +610,7 @@
           <a:p>
             <a:fld id="{EDA8BDCB-78B0-4602-A2A4-46193FA57CAD}" type="datetimeFigureOut">
               <a:rPr lang="en-US" smtClean="0"/>
-              <a:t>7/15/2024</a:t>
+              <a:t>7/16/2024</a:t>
             </a:fld>
             <a:endParaRPr lang="en-US"/>
           </a:p>
@@ -804,7 +804,7 @@
           <a:p>
             <a:fld id="{EDA8BDCB-78B0-4602-A2A4-46193FA57CAD}" type="datetimeFigureOut">
               <a:rPr lang="en-US" smtClean="0"/>
-              <a:t>7/15/2024</a:t>
+              <a:t>7/16/2024</a:t>
             </a:fld>
             <a:endParaRPr lang="en-US"/>
           </a:p>
@@ -1077,7 +1077,7 @@
           <a:p>
             <a:fld id="{EDA8BDCB-78B0-4602-A2A4-46193FA57CAD}" type="datetimeFigureOut">
               <a:rPr lang="en-US" smtClean="0"/>
-              <a:t>7/15/2024</a:t>
+              <a:t>7/16/2024</a:t>
             </a:fld>
             <a:endParaRPr lang="en-US"/>
           </a:p>
@@ -1418,7 +1418,7 @@
           <a:p>
             <a:fld id="{EDA8BDCB-78B0-4602-A2A4-46193FA57CAD}" type="datetimeFigureOut">
               <a:rPr lang="en-US" smtClean="0"/>
-              <a:t>7/15/2024</a:t>
+              <a:t>7/16/2024</a:t>
             </a:fld>
             <a:endParaRPr lang="en-US"/>
           </a:p>
@@ -2041,7 +2041,7 @@
           <a:p>
             <a:fld id="{EDA8BDCB-78B0-4602-A2A4-46193FA57CAD}" type="datetimeFigureOut">
               <a:rPr lang="en-US" smtClean="0"/>
-              <a:t>7/15/2024</a:t>
+              <a:t>7/16/2024</a:t>
             </a:fld>
             <a:endParaRPr lang="en-US"/>
           </a:p>
@@ -2898,7 +2898,7 @@
           <a:p>
             <a:fld id="{EDA8BDCB-78B0-4602-A2A4-46193FA57CAD}" type="datetimeFigureOut">
               <a:rPr lang="en-US" smtClean="0"/>
-              <a:t>7/15/2024</a:t>
+              <a:t>7/16/2024</a:t>
             </a:fld>
             <a:endParaRPr lang="en-US"/>
           </a:p>
@@ -3068,7 +3068,7 @@
           <a:p>
             <a:fld id="{EDA8BDCB-78B0-4602-A2A4-46193FA57CAD}" type="datetimeFigureOut">
               <a:rPr lang="en-US" smtClean="0"/>
-              <a:t>7/15/2024</a:t>
+              <a:t>7/16/2024</a:t>
             </a:fld>
             <a:endParaRPr lang="en-US"/>
           </a:p>
@@ -3248,7 +3248,7 @@
           <a:p>
             <a:fld id="{EDA8BDCB-78B0-4602-A2A4-46193FA57CAD}" type="datetimeFigureOut">
               <a:rPr lang="en-US" smtClean="0"/>
-              <a:t>7/15/2024</a:t>
+              <a:t>7/16/2024</a:t>
             </a:fld>
             <a:endParaRPr lang="en-US"/>
           </a:p>
@@ -3418,7 +3418,7 @@
           <a:p>
             <a:fld id="{EDA8BDCB-78B0-4602-A2A4-46193FA57CAD}" type="datetimeFigureOut">
               <a:rPr lang="en-US" smtClean="0"/>
-              <a:t>7/15/2024</a:t>
+              <a:t>7/16/2024</a:t>
             </a:fld>
             <a:endParaRPr lang="en-US"/>
           </a:p>
@@ -3665,7 +3665,7 @@
           <a:p>
             <a:fld id="{EDA8BDCB-78B0-4602-A2A4-46193FA57CAD}" type="datetimeFigureOut">
               <a:rPr lang="en-US" smtClean="0"/>
-              <a:t>7/15/2024</a:t>
+              <a:t>7/16/2024</a:t>
             </a:fld>
             <a:endParaRPr lang="en-US"/>
           </a:p>
@@ -3957,7 +3957,7 @@
           <a:p>
             <a:fld id="{EDA8BDCB-78B0-4602-A2A4-46193FA57CAD}" type="datetimeFigureOut">
               <a:rPr lang="en-US" smtClean="0"/>
-              <a:t>7/15/2024</a:t>
+              <a:t>7/16/2024</a:t>
             </a:fld>
             <a:endParaRPr lang="en-US"/>
           </a:p>
@@ -4401,7 +4401,7 @@
           <a:p>
             <a:fld id="{EDA8BDCB-78B0-4602-A2A4-46193FA57CAD}" type="datetimeFigureOut">
               <a:rPr lang="en-US" smtClean="0"/>
-              <a:t>7/15/2024</a:t>
+              <a:t>7/16/2024</a:t>
             </a:fld>
             <a:endParaRPr lang="en-US"/>
           </a:p>
@@ -4519,7 +4519,7 @@
           <a:p>
             <a:fld id="{EDA8BDCB-78B0-4602-A2A4-46193FA57CAD}" type="datetimeFigureOut">
               <a:rPr lang="en-US" smtClean="0"/>
-              <a:t>7/15/2024</a:t>
+              <a:t>7/16/2024</a:t>
             </a:fld>
             <a:endParaRPr lang="en-US"/>
           </a:p>
@@ -4614,7 +4614,7 @@
           <a:p>
             <a:fld id="{EDA8BDCB-78B0-4602-A2A4-46193FA57CAD}" type="datetimeFigureOut">
               <a:rPr lang="en-US" smtClean="0"/>
-              <a:t>7/15/2024</a:t>
+              <a:t>7/16/2024</a:t>
             </a:fld>
             <a:endParaRPr lang="en-US"/>
           </a:p>
@@ -4893,7 +4893,7 @@
           <a:p>
             <a:fld id="{EDA8BDCB-78B0-4602-A2A4-46193FA57CAD}" type="datetimeFigureOut">
               <a:rPr lang="en-US" smtClean="0"/>
-              <a:t>7/15/2024</a:t>
+              <a:t>7/16/2024</a:t>
             </a:fld>
             <a:endParaRPr lang="en-US"/>
           </a:p>
@@ -5167,7 +5167,7 @@
           <a:p>
             <a:fld id="{EDA8BDCB-78B0-4602-A2A4-46193FA57CAD}" type="datetimeFigureOut">
               <a:rPr lang="en-US" smtClean="0"/>
-              <a:t>7/15/2024</a:t>
+              <a:t>7/16/2024</a:t>
             </a:fld>
             <a:endParaRPr lang="en-US"/>
           </a:p>
@@ -5596,7 +5596,7 @@
           <a:p>
             <a:fld id="{EDA8BDCB-78B0-4602-A2A4-46193FA57CAD}" type="datetimeFigureOut">
               <a:rPr lang="en-US" smtClean="0"/>
-              <a:t>7/15/2024</a:t>
+              <a:t>7/16/2024</a:t>
             </a:fld>
             <a:endParaRPr lang="en-US"/>
           </a:p>
@@ -6603,7 +6603,7 @@
                 <a:latin typeface="Arial" panose="020B0604020202020204" pitchFamily="34" charset="0"/>
                 <a:cs typeface="Arial" panose="020B0604020202020204" pitchFamily="34" charset="0"/>
               </a:rPr>
-              <a:t>Cú pháp chia ra: &lt;Tên biến&gt; *= &lt;Giá trị chia ra&gt;</a:t>
+              <a:t>Cú pháp chia ra: &lt;Tên biến&gt; /= &lt;Giá trị chia ra&gt;</a:t>
             </a:r>
           </a:p>
         </p:txBody>
@@ -7061,7 +7061,7 @@
         </p:blipFill>
         <p:spPr>
           <a:xfrm>
-            <a:off x="1421635" y="3003411"/>
+            <a:off x="1421635" y="3012289"/>
             <a:ext cx="8768075" cy="3557186"/>
           </a:xfrm>
           <a:prstGeom prst="rect">
@@ -11097,7 +11097,7 @@
                 <a:latin typeface="Arial" panose="020B0604020202020204" pitchFamily="34" charset="0"/>
                 <a:cs typeface="Arial" panose="020B0604020202020204" pitchFamily="34" charset="0"/>
               </a:rPr>
-              <a:t>Cú pháp trừ bớt: &lt;Tên biến&gt; += &lt;Giá trị trừ bớt&gt;</a:t>
+              <a:t>Cú pháp trừ bớt: &lt;Tên biến&gt; -= &lt;Giá trị trừ bớt&gt;</a:t>
             </a:r>
           </a:p>
         </p:txBody>

</xml_diff>